<commit_message>
Added neural network demo
</commit_message>
<xml_diff>
--- a/tools of the trade.pptx
+++ b/tools of the trade.pptx
@@ -249,7 +249,7 @@
           <a:p>
             <a:fld id="{1ED7098F-87C7-3046-B8E1-0317C0D8D9C4}" type="datetimeFigureOut">
               <a:rPr lang="en-US" smtClean="0"/>
-              <a:t>3/19/25</a:t>
+              <a:t>3/24/25</a:t>
             </a:fld>
             <a:endParaRPr lang="en-US"/>
           </a:p>
@@ -415,7 +415,7 @@
           <a:p>
             <a:fld id="{A83074A2-D88D-8F43-B619-246CA3905610}" type="datetimeFigureOut">
               <a:rPr lang="en-US" smtClean="0"/>
-              <a:t>3/19/25</a:t>
+              <a:t>3/24/25</a:t>
             </a:fld>
             <a:endParaRPr lang="en-US"/>
           </a:p>
@@ -2231,44 +2231,6 @@
               <a:rPr lang="nl-NL" dirty="0"/>
               <a:t> Trade</a:t>
             </a:r>
-          </a:p>
-        </p:txBody>
-      </p:sp>
-      <p:sp>
-        <p:nvSpPr>
-          <p:cNvPr id="5" name="TextBox 4"/>
-          <p:cNvSpPr txBox="1">
-            <a:spLocks noGrp="1"/>
-          </p:cNvSpPr>
-          <p:nvPr>
-            <p:ph type="body" sz="quarter" idx="11"/>
-          </p:nvPr>
-        </p:nvSpPr>
-        <p:spPr>
-          <a:xfrm>
-            <a:off x="669926" y="5095875"/>
-            <a:ext cx="7839075" cy="276999"/>
-          </a:xfrm>
-          <a:prstGeom prst="rect">
-            <a:avLst/>
-          </a:prstGeom>
-          <a:noFill/>
-        </p:spPr>
-        <p:txBody>
-          <a:bodyPr wrap="square" rtlCol="0">
-            <a:spAutoFit/>
-          </a:bodyPr>
-          <a:lstStyle/>
-          <a:p>
-            <a:pPr>
-              <a:lnSpc>
-                <a:spcPct val="100000"/>
-              </a:lnSpc>
-            </a:pPr>
-            <a:endParaRPr lang="nl-NL" altLang="en-US" sz="1200" dirty="0">
-              <a:latin typeface="Arial" panose="020B0604020202020204" pitchFamily="34" charset="0"/>
-              <a:cs typeface="Arial" panose="020B0604020202020204" pitchFamily="34" charset="0"/>
-            </a:endParaRPr>
           </a:p>
         </p:txBody>
       </p:sp>
@@ -7357,18 +7319,18 @@
 </file>
 
 <file path=customXml/item1.xml><?xml version="1.0" encoding="utf-8"?>
-<p:properties xmlns:p="http://schemas.microsoft.com/office/2006/metadata/properties" xmlns:xsi="http://www.w3.org/2001/XMLSchema-instance">
-  <documentManagement/>
-</p:properties>
-</file>
-
-<file path=customXml/item2.xml><?xml version="1.0" encoding="utf-8"?>
 <?mso-contentType ?>
 <FormTemplates xmlns="http://schemas.microsoft.com/sharepoint/v3/contenttype/forms">
   <Display>DocumentLibraryForm</Display>
   <Edit>DocumentLibraryForm</Edit>
   <New>DocumentLibraryForm</New>
 </FormTemplates>
+</file>
+
+<file path=customXml/item2.xml><?xml version="1.0" encoding="utf-8"?>
+<p:properties xmlns:p="http://schemas.microsoft.com/office/2006/metadata/properties" xmlns:xsi="http://www.w3.org/2001/XMLSchema-instance">
+  <documentManagement/>
+</p:properties>
 </file>
 
 <file path=customXml/item3.xml><?xml version="1.0" encoding="utf-8"?>
@@ -7589,6 +7551,14 @@
 </file>
 
 <file path=customXml/itemProps1.xml><?xml version="1.0" encoding="utf-8"?>
+<ds:datastoreItem xmlns:ds="http://schemas.openxmlformats.org/officeDocument/2006/customXml" ds:itemID="{EE540D17-DFE7-4DA1-AB7C-9204237EF006}">
+  <ds:schemaRefs>
+    <ds:schemaRef ds:uri="http://schemas.microsoft.com/sharepoint/v3/contenttype/forms"/>
+  </ds:schemaRefs>
+</ds:datastoreItem>
+</file>
+
+<file path=customXml/itemProps2.xml><?xml version="1.0" encoding="utf-8"?>
 <ds:datastoreItem xmlns:ds="http://schemas.openxmlformats.org/officeDocument/2006/customXml" ds:itemID="{665827D5-5A12-48FB-BA20-1E7CB9BA5BA1}">
   <ds:schemaRefs>
     <ds:schemaRef ds:uri="http://schemas.microsoft.com/office/2006/documentManagement/types"/>
@@ -7601,14 +7571,6 @@
     <ds:schemaRef ds:uri="53aadeef-871c-4d8b-955c-28f1a1590244"/>
     <ds:schemaRef ds:uri="http://www.w3.org/XML/1998/namespace"/>
     <ds:schemaRef ds:uri="http://purl.org/dc/dcmitype/"/>
-  </ds:schemaRefs>
-</ds:datastoreItem>
-</file>
-
-<file path=customXml/itemProps2.xml><?xml version="1.0" encoding="utf-8"?>
-<ds:datastoreItem xmlns:ds="http://schemas.openxmlformats.org/officeDocument/2006/customXml" ds:itemID="{EE540D17-DFE7-4DA1-AB7C-9204237EF006}">
-  <ds:schemaRefs>
-    <ds:schemaRef ds:uri="http://schemas.microsoft.com/sharepoint/v3/contenttype/forms"/>
   </ds:schemaRefs>
 </ds:datastoreItem>
 </file>

</xml_diff>